<commit_message>
Updated research to coming soon.
</commit_message>
<xml_diff>
--- a/translations/en-us/fll/Background.pptx
+++ b/translations/en-us/fll/Background.pptx
@@ -5,11 +5,12 @@
     <p:sldMasterId id="2147483779" r:id="rId1"/>
   </p:sldMasterIdLst>
   <p:notesMasterIdLst>
-    <p:notesMasterId r:id="rId4"/>
+    <p:notesMasterId r:id="rId5"/>
   </p:notesMasterIdLst>
   <p:sldIdLst>
     <p:sldId id="256" r:id="rId2"/>
-    <p:sldId id="257" r:id="rId3"/>
+    <p:sldId id="258" r:id="rId3"/>
+    <p:sldId id="259" r:id="rId4"/>
   </p:sldIdLst>
   <p:sldSz cx="9144000" cy="6858000" type="screen4x3"/>
   <p:notesSz cx="6858000" cy="9144000"/>
@@ -4709,7 +4710,7 @@
           <a:p>
             <a:r>
               <a:rPr lang="en-US" dirty="0" smtClean="0"/>
-              <a:t>By Not the Droids YOU ARE LOOKING FOR</a:t>
+              <a:t>TEAM 4043 BAYOU BUILDERS</a:t>
             </a:r>
             <a:endParaRPr lang="en-US" dirty="0"/>
           </a:p>
@@ -4761,6 +4762,30 @@
           </a:p>
         </p:txBody>
       </p:sp>
+      <p:pic>
+        <p:nvPicPr>
+          <p:cNvPr id="6" name="Picture 5"/>
+          <p:cNvPicPr>
+            <a:picLocks noChangeAspect="1"/>
+          </p:cNvPicPr>
+          <p:nvPr/>
+        </p:nvPicPr>
+        <p:blipFill>
+          <a:blip r:embed="rId3"/>
+          <a:stretch>
+            <a:fillRect/>
+          </a:stretch>
+        </p:blipFill>
+        <p:spPr>
+          <a:xfrm>
+            <a:off x="4074181" y="4935360"/>
+            <a:ext cx="988540" cy="741405"/>
+          </a:xfrm>
+          <a:prstGeom prst="rect">
+            <a:avLst/>
+          </a:prstGeom>
+        </p:spPr>
+      </p:pic>
     </p:spTree>
     <p:extLst>
       <p:ext uri="{BB962C8B-B14F-4D97-AF65-F5344CB8AC3E}">
@@ -4808,9 +4833,12 @@
           <a:p>
             <a:r>
               <a:rPr lang="en-US" dirty="0" smtClean="0"/>
-              <a:t>Coming Soon</a:t>
-            </a:r>
-            <a:endParaRPr lang="en-US" dirty="0"/>
+              <a:t>About </a:t>
+            </a:r>
+            <a:r>
+              <a:rPr lang="en-US" dirty="0"/>
+              <a:t>Us</a:t>
+            </a:r>
           </a:p>
         </p:txBody>
       </p:sp>
@@ -4824,33 +4852,51 @@
             <p:ph idx="1"/>
           </p:nvPr>
         </p:nvSpPr>
+        <p:spPr>
+          <a:xfrm>
+            <a:off x="241738" y="1853552"/>
+            <a:ext cx="4331451" cy="4478554"/>
+          </a:xfrm>
+        </p:spPr>
+        <p:txBody>
+          <a:bodyPr>
+            <a:noAutofit/>
+          </a:bodyPr>
+          <a:lstStyle/>
+          <a:p>
+            <a:pPr>
+              <a:lnSpc>
+                <a:spcPct val="150000"/>
+              </a:lnSpc>
+              <a:buFont typeface="Wingdings" panose="05000000000000000000" pitchFamily="2" charset="2"/>
+              <a:buChar char="§"/>
+            </a:pPr>
+            <a:r>
+              <a:rPr lang="en-US" sz="1600" dirty="0" smtClean="0"/>
+              <a:t>COMING SOON</a:t>
+            </a:r>
+            <a:endParaRPr lang="en-US" sz="1600" dirty="0" smtClean="0"/>
+          </a:p>
+        </p:txBody>
+      </p:sp>
+      <p:sp>
+        <p:nvSpPr>
+          <p:cNvPr id="4" name="Footer Placeholder 3"/>
+          <p:cNvSpPr>
+            <a:spLocks noGrp="1"/>
+          </p:cNvSpPr>
+          <p:nvPr>
+            <p:ph type="ftr" sz="quarter" idx="11"/>
+          </p:nvPr>
+        </p:nvSpPr>
         <p:spPr/>
         <p:txBody>
           <a:bodyPr/>
           <a:lstStyle/>
           <a:p>
-            <a:endParaRPr lang="en-US" dirty="0"/>
-          </a:p>
-        </p:txBody>
-      </p:sp>
-      <p:sp>
-        <p:nvSpPr>
-          <p:cNvPr id="4" name="Footer Placeholder 3"/>
-          <p:cNvSpPr>
-            <a:spLocks noGrp="1"/>
-          </p:cNvSpPr>
-          <p:nvPr>
-            <p:ph type="ftr" sz="quarter" idx="11"/>
-          </p:nvPr>
-        </p:nvSpPr>
-        <p:spPr/>
-        <p:txBody>
-          <a:bodyPr/>
-          <a:lstStyle/>
-          <a:p>
-            <a:r>
-              <a:rPr lang="en-US" smtClean="0"/>
-              <a:t>Copyright 2017, EV3Lessons.com (Last Edit 8/18/2017)</a:t>
+            <a:r>
+              <a:rPr lang="en-US" smtClean="0"/>
+              <a:t>Copyright 2017, EV3Lessons.com (Last Edit 8/24/2017)</a:t>
             </a:r>
             <a:endParaRPr lang="en-US" dirty="0"/>
           </a:p>
@@ -4882,7 +4928,194 @@
     </p:spTree>
     <p:extLst>
       <p:ext uri="{BB962C8B-B14F-4D97-AF65-F5344CB8AC3E}">
-        <p14:creationId xmlns:p14="http://schemas.microsoft.com/office/powerpoint/2010/main" val="663123803"/>
+        <p14:creationId xmlns:p14="http://schemas.microsoft.com/office/powerpoint/2010/main" val="1053335735"/>
+      </p:ext>
+    </p:extLst>
+  </p:cSld>
+  <p:clrMapOvr>
+    <a:masterClrMapping/>
+  </p:clrMapOvr>
+</p:sld>
+</file>
+
+<file path=ppt/slides/slide3.xml><?xml version="1.0" encoding="utf-8"?>
+<p:sld xmlns:a="http://schemas.openxmlformats.org/drawingml/2006/main" xmlns:r="http://schemas.openxmlformats.org/officeDocument/2006/relationships" xmlns:p="http://schemas.openxmlformats.org/presentationml/2006/main">
+  <p:cSld>
+    <p:spTree>
+      <p:nvGrpSpPr>
+        <p:cNvPr id="1" name=""/>
+        <p:cNvGrpSpPr/>
+        <p:nvPr/>
+      </p:nvGrpSpPr>
+      <p:grpSpPr>
+        <a:xfrm>
+          <a:off x="0" y="0"/>
+          <a:ext cx="0" cy="0"/>
+          <a:chOff x="0" y="0"/>
+          <a:chExt cx="0" cy="0"/>
+        </a:xfrm>
+      </p:grpSpPr>
+      <p:sp>
+        <p:nvSpPr>
+          <p:cNvPr id="2" name="Title 1"/>
+          <p:cNvSpPr>
+            <a:spLocks noGrp="1"/>
+          </p:cNvSpPr>
+          <p:nvPr>
+            <p:ph type="title"/>
+          </p:nvPr>
+        </p:nvSpPr>
+        <p:spPr/>
+        <p:txBody>
+          <a:bodyPr/>
+          <a:lstStyle/>
+          <a:p>
+            <a:r>
+              <a:rPr lang="en-US" dirty="0"/>
+              <a:t>Credits</a:t>
+            </a:r>
+          </a:p>
+        </p:txBody>
+      </p:sp>
+      <p:sp>
+        <p:nvSpPr>
+          <p:cNvPr id="3" name="Content Placeholder 2"/>
+          <p:cNvSpPr>
+            <a:spLocks noGrp="1"/>
+          </p:cNvSpPr>
+          <p:nvPr>
+            <p:ph idx="1"/>
+          </p:nvPr>
+        </p:nvSpPr>
+        <p:spPr>
+          <a:xfrm>
+            <a:off x="241739" y="1845734"/>
+            <a:ext cx="8681544" cy="4023360"/>
+          </a:xfrm>
+        </p:spPr>
+        <p:txBody>
+          <a:bodyPr>
+            <a:normAutofit/>
+          </a:bodyPr>
+          <a:lstStyle/>
+          <a:p>
+            <a:r>
+              <a:rPr lang="en-US" dirty="0"/>
+              <a:t>This lesson was written by </a:t>
+            </a:r>
+            <a:r>
+              <a:rPr lang="en-US" dirty="0" smtClean="0"/>
+              <a:t>the Bayou Builders, </a:t>
+            </a:r>
+            <a:r>
+              <a:rPr lang="en-US" dirty="0" smtClean="0"/>
+              <a:t>with some edits by EV3Lessons</a:t>
+            </a:r>
+          </a:p>
+          <a:p>
+            <a:r>
+              <a:rPr lang="en-US" dirty="0" smtClean="0"/>
+              <a:t>More </a:t>
+            </a:r>
+            <a:r>
+              <a:rPr lang="en-US" dirty="0" smtClean="0"/>
+              <a:t>lessons available at www.ev3lesssons.com</a:t>
+            </a:r>
+            <a:endParaRPr lang="en-US" dirty="0"/>
+          </a:p>
+          <a:p>
+            <a:pPr marL="0" indent="0">
+              <a:buNone/>
+            </a:pPr>
+            <a:endParaRPr lang="en-US" dirty="0"/>
+          </a:p>
+          <a:p>
+            <a:endParaRPr lang="en-US" dirty="0"/>
+          </a:p>
+          <a:p>
+            <a:endParaRPr lang="en-US" dirty="0"/>
+          </a:p>
+        </p:txBody>
+      </p:sp>
+      <p:sp>
+        <p:nvSpPr>
+          <p:cNvPr id="4" name="Footer Placeholder 3"/>
+          <p:cNvSpPr>
+            <a:spLocks noGrp="1"/>
+          </p:cNvSpPr>
+          <p:nvPr>
+            <p:ph type="ftr" sz="quarter" idx="11"/>
+          </p:nvPr>
+        </p:nvSpPr>
+        <p:spPr/>
+        <p:txBody>
+          <a:bodyPr/>
+          <a:lstStyle/>
+          <a:p>
+            <a:r>
+              <a:rPr lang="en-US" smtClean="0"/>
+              <a:t>Copyright 2017, EV3Lessons.com (Last Edit 8/24/2017)</a:t>
+            </a:r>
+            <a:endParaRPr lang="en-US" dirty="0"/>
+          </a:p>
+        </p:txBody>
+      </p:sp>
+      <p:sp>
+        <p:nvSpPr>
+          <p:cNvPr id="5" name="Slide Number Placeholder 4"/>
+          <p:cNvSpPr>
+            <a:spLocks noGrp="1"/>
+          </p:cNvSpPr>
+          <p:nvPr>
+            <p:ph type="sldNum" sz="quarter" idx="12"/>
+          </p:nvPr>
+        </p:nvSpPr>
+        <p:spPr/>
+        <p:txBody>
+          <a:bodyPr/>
+          <a:lstStyle/>
+          <a:p>
+            <a:fld id="{6D22F896-40B5-4ADD-8801-0D06FADFA095}" type="slidenum">
+              <a:rPr lang="en-US" smtClean="0"/>
+              <a:t>3</a:t>
+            </a:fld>
+            <a:endParaRPr lang="en-US" dirty="0"/>
+          </a:p>
+        </p:txBody>
+      </p:sp>
+      <p:pic>
+        <p:nvPicPr>
+          <p:cNvPr id="6" name="Picture 5"/>
+          <p:cNvPicPr>
+            <a:picLocks noChangeAspect="1"/>
+          </p:cNvPicPr>
+          <p:nvPr/>
+        </p:nvPicPr>
+        <p:blipFill rotWithShape="1">
+          <a:blip r:embed="rId2">
+            <a:extLst>
+              <a:ext uri="{28A0092B-C50C-407E-A947-70E740481C1C}">
+                <a14:useLocalDpi xmlns:a14="http://schemas.microsoft.com/office/drawing/2010/main" val="0"/>
+              </a:ext>
+            </a:extLst>
+          </a:blip>
+          <a:srcRect l="9379" t="11606" r="9183" b="11463"/>
+          <a:stretch/>
+        </p:blipFill>
+        <p:spPr>
+          <a:xfrm>
+            <a:off x="241739" y="3890368"/>
+            <a:ext cx="8620008" cy="2087099"/>
+          </a:xfrm>
+          <a:prstGeom prst="rect">
+            <a:avLst/>
+          </a:prstGeom>
+        </p:spPr>
+      </p:pic>
+    </p:spTree>
+    <p:extLst>
+      <p:ext uri="{BB962C8B-B14F-4D97-AF65-F5344CB8AC3E}">
+        <p14:creationId xmlns:p14="http://schemas.microsoft.com/office/powerpoint/2010/main" val="910999366"/>
       </p:ext>
     </p:extLst>
   </p:cSld>

</xml_diff>